<commit_message>
diapo + histoire (pas vraiment inspirée)
</commit_message>
<xml_diff>
--- a/Diapo/DIapo.pptx
+++ b/Diapo/DIapo.pptx
@@ -5,18 +5,21 @@
     <p:sldMasterId id="2147483648" r:id="rId2"/>
   </p:sldMasterIdLst>
   <p:handoutMasterIdLst>
-    <p:handoutMasterId r:id="rId12"/>
+    <p:handoutMasterId r:id="rId15"/>
   </p:handoutMasterIdLst>
   <p:sldIdLst>
     <p:sldId id="256" r:id="rId3"/>
     <p:sldId id="271" r:id="rId4"/>
     <p:sldId id="272" r:id="rId5"/>
-    <p:sldId id="268" r:id="rId6"/>
-    <p:sldId id="257" r:id="rId7"/>
-    <p:sldId id="267" r:id="rId8"/>
-    <p:sldId id="259" r:id="rId9"/>
-    <p:sldId id="269" r:id="rId10"/>
-    <p:sldId id="270" r:id="rId11"/>
+    <p:sldId id="273" r:id="rId6"/>
+    <p:sldId id="268" r:id="rId7"/>
+    <p:sldId id="257" r:id="rId8"/>
+    <p:sldId id="267" r:id="rId9"/>
+    <p:sldId id="259" r:id="rId10"/>
+    <p:sldId id="269" r:id="rId11"/>
+    <p:sldId id="270" r:id="rId12"/>
+    <p:sldId id="274" r:id="rId13"/>
+    <p:sldId id="275" r:id="rId14"/>
   </p:sldIdLst>
   <p:sldSz cx="9144000" cy="5143500" type="screen16x9"/>
   <p:notesSz cx="6858000" cy="9144000"/>
@@ -116,6 +119,26 @@
     </a:lvl9pPr>
   </p:defaultTextStyle>
   <p:extLst>
+    <p:ext uri="{521415D9-36F7-43E2-AB2F-B90AF26B5E84}">
+      <p14:sectionLst xmlns:p14="http://schemas.microsoft.com/office/powerpoint/2010/main">
+        <p14:section name="Section par défaut" id="{997430E2-E81B-4688-A7CD-C915A6284039}">
+          <p14:sldIdLst>
+            <p14:sldId id="256"/>
+            <p14:sldId id="271"/>
+            <p14:sldId id="272"/>
+            <p14:sldId id="273"/>
+            <p14:sldId id="268"/>
+            <p14:sldId id="257"/>
+            <p14:sldId id="267"/>
+            <p14:sldId id="259"/>
+            <p14:sldId id="269"/>
+            <p14:sldId id="270"/>
+            <p14:sldId id="274"/>
+            <p14:sldId id="275"/>
+          </p14:sldIdLst>
+        </p14:section>
+      </p14:sectionLst>
+    </p:ext>
     <p:ext uri="{EFAFB233-063F-42B5-8137-9DF3F51BA10A}">
       <p15:sldGuideLst xmlns:p15="http://schemas.microsoft.com/office/powerpoint/2012/main">
         <p15:guide id="1" orient="horz" pos="1620">
@@ -4091,11 +4114,7 @@
           <a:p>
             <a:r>
               <a:rPr lang="fr-FR" sz="1400" dirty="0" smtClean="0"/>
-              <a:t>DEBARD </a:t>
-            </a:r>
-            <a:r>
-              <a:rPr lang="fr-FR" sz="1400" dirty="0" smtClean="0"/>
-              <a:t>Etienne – PETITCUENOT Mélanie</a:t>
+              <a:t>DEBARD Etienne – PETITCUENOT Mélanie</a:t>
             </a:r>
             <a:endParaRPr lang="fr-FR" sz="1400" dirty="0"/>
           </a:p>
@@ -4111,18 +4130,446 @@
   <p:clrMapOvr>
     <a:masterClrMapping/>
   </p:clrMapOvr>
-  <mc:AlternateContent xmlns:mc="http://schemas.openxmlformats.org/markup-compatibility/2006">
-    <mc:Choice xmlns:p14="http://schemas.microsoft.com/office/powerpoint/2010/main" Requires="p14">
+  <mc:AlternateContent xmlns:mc="http://schemas.openxmlformats.org/markup-compatibility/2006" xmlns:p14="http://schemas.microsoft.com/office/powerpoint/2010/main">
+    <mc:Choice Requires="p14">
       <p:transition spd="slow" p14:dur="3900">
         <p14:glitter pattern="hexagon"/>
       </p:transition>
     </mc:Choice>
-    <mc:Fallback>
+    <mc:Fallback xmlns="">
       <p:transition spd="slow">
         <p:fade/>
       </p:transition>
     </mc:Fallback>
   </mc:AlternateContent>
+  <p:timing>
+    <p:tnLst>
+      <p:par>
+        <p:cTn id="1" dur="indefinite" restart="never" nodeType="tmRoot"/>
+      </p:par>
+    </p:tnLst>
+  </p:timing>
+</p:sld>
+</file>
+
+<file path=ppt/slides/slide10.xml><?xml version="1.0" encoding="utf-8"?>
+<p:sld xmlns:a="http://schemas.openxmlformats.org/drawingml/2006/main" xmlns:r="http://schemas.openxmlformats.org/officeDocument/2006/relationships" xmlns:p="http://schemas.openxmlformats.org/presentationml/2006/main">
+  <p:cSld>
+    <p:spTree>
+      <p:nvGrpSpPr>
+        <p:cNvPr id="1" name=""/>
+        <p:cNvGrpSpPr/>
+        <p:nvPr/>
+      </p:nvGrpSpPr>
+      <p:grpSpPr>
+        <a:xfrm>
+          <a:off x="0" y="0"/>
+          <a:ext cx="0" cy="0"/>
+          <a:chOff x="0" y="0"/>
+          <a:chExt cx="0" cy="0"/>
+        </a:xfrm>
+      </p:grpSpPr>
+      <p:sp>
+        <p:nvSpPr>
+          <p:cNvPr id="5" name="Espace réservé du texte 4"/>
+          <p:cNvSpPr>
+            <a:spLocks noGrp="1"/>
+          </p:cNvSpPr>
+          <p:nvPr>
+            <p:ph type="body" sz="quarter" idx="13"/>
+          </p:nvPr>
+        </p:nvSpPr>
+        <p:spPr/>
+        <p:txBody>
+          <a:bodyPr/>
+          <a:lstStyle/>
+          <a:p>
+            <a:r>
+              <a:rPr lang="fr-FR" dirty="0" smtClean="0"/>
+              <a:t>Liste des items</a:t>
+            </a:r>
+            <a:endParaRPr lang="fr-FR" dirty="0"/>
+          </a:p>
+        </p:txBody>
+      </p:sp>
+      <p:pic>
+        <p:nvPicPr>
+          <p:cNvPr id="9" name="Espace réservé du contenu 8"/>
+          <p:cNvPicPr>
+            <a:picLocks noGrp="1" noChangeAspect="1"/>
+          </p:cNvPicPr>
+          <p:nvPr>
+            <p:ph sz="half" idx="2"/>
+          </p:nvPr>
+        </p:nvPicPr>
+        <p:blipFill>
+          <a:blip r:embed="rId2">
+            <a:extLst>
+              <a:ext uri="{28A0092B-C50C-407E-A947-70E740481C1C}">
+                <a14:useLocalDpi xmlns:a14="http://schemas.microsoft.com/office/drawing/2010/main" val="0"/>
+              </a:ext>
+            </a:extLst>
+          </a:blip>
+          <a:stretch>
+            <a:fillRect/>
+          </a:stretch>
+        </p:blipFill>
+        <p:spPr>
+          <a:xfrm>
+            <a:off x="3689130" y="838132"/>
+            <a:ext cx="5330501" cy="4206834"/>
+          </a:xfrm>
+        </p:spPr>
+      </p:pic>
+      <p:sp>
+        <p:nvSpPr>
+          <p:cNvPr id="2" name="Titre 1"/>
+          <p:cNvSpPr>
+            <a:spLocks noGrp="1"/>
+          </p:cNvSpPr>
+          <p:nvPr>
+            <p:ph type="title"/>
+          </p:nvPr>
+        </p:nvSpPr>
+        <p:spPr/>
+        <p:txBody>
+          <a:bodyPr/>
+          <a:lstStyle/>
+          <a:p>
+            <a:r>
+              <a:rPr lang="fr-FR" dirty="0" smtClean="0"/>
+              <a:t>Chapitre 4</a:t>
+            </a:r>
+            <a:endParaRPr lang="fr-FR" dirty="0"/>
+          </a:p>
+        </p:txBody>
+      </p:sp>
+      <p:sp>
+        <p:nvSpPr>
+          <p:cNvPr id="7" name="Espace réservé du texte 6"/>
+          <p:cNvSpPr>
+            <a:spLocks noGrp="1"/>
+          </p:cNvSpPr>
+          <p:nvPr>
+            <p:ph type="body" sz="quarter" idx="16"/>
+          </p:nvPr>
+        </p:nvSpPr>
+        <p:spPr>
+          <a:xfrm>
+            <a:off x="314226" y="2363164"/>
+            <a:ext cx="2831629" cy="589563"/>
+          </a:xfrm>
+        </p:spPr>
+        <p:txBody>
+          <a:bodyPr>
+            <a:normAutofit fontScale="77500" lnSpcReduction="20000"/>
+          </a:bodyPr>
+          <a:lstStyle/>
+          <a:p>
+            <a:r>
+              <a:rPr lang="fr-FR" dirty="0" smtClean="0"/>
+              <a:t>Utilisation d’un bloc statique</a:t>
+            </a:r>
+            <a:endParaRPr lang="fr-FR" dirty="0"/>
+          </a:p>
+        </p:txBody>
+      </p:sp>
+    </p:spTree>
+    <p:extLst>
+      <p:ext uri="{BB962C8B-B14F-4D97-AF65-F5344CB8AC3E}">
+        <p14:creationId xmlns:p14="http://schemas.microsoft.com/office/powerpoint/2010/main" val="3121328382"/>
+      </p:ext>
+    </p:extLst>
+  </p:cSld>
+  <p:clrMapOvr>
+    <a:masterClrMapping/>
+  </p:clrMapOvr>
+  <mc:AlternateContent xmlns:mc="http://schemas.openxmlformats.org/markup-compatibility/2006" xmlns:p15="http://schemas.microsoft.com/office/powerpoint/2012/main">
+    <mc:Choice Requires="p15">
+      <p:transition xmlns:p14="http://schemas.microsoft.com/office/powerpoint/2010/main" spd="slow" p14:dur="1250">
+        <p15:prstTrans prst="airplane"/>
+      </p:transition>
+    </mc:Choice>
+    <mc:Fallback xmlns="">
+      <p:transition spd="slow">
+        <p:fade/>
+      </p:transition>
+    </mc:Fallback>
+  </mc:AlternateContent>
+  <p:timing>
+    <p:tnLst>
+      <p:par>
+        <p:cTn id="1" dur="indefinite" restart="never" nodeType="tmRoot"/>
+      </p:par>
+    </p:tnLst>
+  </p:timing>
+</p:sld>
+</file>
+
+<file path=ppt/slides/slide11.xml><?xml version="1.0" encoding="utf-8"?>
+<p:sld xmlns:a="http://schemas.openxmlformats.org/drawingml/2006/main" xmlns:r="http://schemas.openxmlformats.org/officeDocument/2006/relationships" xmlns:p="http://schemas.openxmlformats.org/presentationml/2006/main">
+  <p:cSld>
+    <p:spTree>
+      <p:nvGrpSpPr>
+        <p:cNvPr id="1" name=""/>
+        <p:cNvGrpSpPr/>
+        <p:nvPr/>
+      </p:nvGrpSpPr>
+      <p:grpSpPr>
+        <a:xfrm>
+          <a:off x="0" y="0"/>
+          <a:ext cx="0" cy="0"/>
+          <a:chOff x="0" y="0"/>
+          <a:chExt cx="0" cy="0"/>
+        </a:xfrm>
+      </p:grpSpPr>
+      <p:sp>
+        <p:nvSpPr>
+          <p:cNvPr id="2" name="Titre 1"/>
+          <p:cNvSpPr>
+            <a:spLocks noGrp="1"/>
+          </p:cNvSpPr>
+          <p:nvPr>
+            <p:ph type="title"/>
+          </p:nvPr>
+        </p:nvSpPr>
+        <p:spPr/>
+        <p:txBody>
+          <a:bodyPr>
+            <a:normAutofit/>
+          </a:bodyPr>
+          <a:lstStyle/>
+          <a:p>
+            <a:r>
+              <a:rPr lang="fr-FR" dirty="0" smtClean="0"/>
+              <a:t>Améliorations futures</a:t>
+            </a:r>
+            <a:endParaRPr lang="fr-FR" dirty="0"/>
+          </a:p>
+        </p:txBody>
+      </p:sp>
+      <p:sp>
+        <p:nvSpPr>
+          <p:cNvPr id="3" name="Sous-titre 2"/>
+          <p:cNvSpPr>
+            <a:spLocks noGrp="1"/>
+          </p:cNvSpPr>
+          <p:nvPr>
+            <p:ph type="subTitle" idx="13"/>
+          </p:nvPr>
+        </p:nvSpPr>
+        <p:spPr/>
+        <p:txBody>
+          <a:bodyPr/>
+          <a:lstStyle/>
+          <a:p>
+            <a:r>
+              <a:rPr lang="fr-FR" dirty="0" smtClean="0"/>
+              <a:t>Chapitre 5</a:t>
+            </a:r>
+            <a:endParaRPr lang="fr-FR" dirty="0"/>
+          </a:p>
+        </p:txBody>
+      </p:sp>
+    </p:spTree>
+    <p:extLst>
+      <p:ext uri="{BB962C8B-B14F-4D97-AF65-F5344CB8AC3E}">
+        <p14:creationId xmlns:p14="http://schemas.microsoft.com/office/powerpoint/2010/main" val="3833742257"/>
+      </p:ext>
+    </p:extLst>
+  </p:cSld>
+  <p:clrMapOvr>
+    <a:masterClrMapping/>
+  </p:clrMapOvr>
+  <mc:AlternateContent xmlns:mc="http://schemas.openxmlformats.org/markup-compatibility/2006" xmlns:p15="http://schemas.microsoft.com/office/powerpoint/2012/main">
+    <mc:Choice Requires="p15">
+      <p:transition xmlns:p14="http://schemas.microsoft.com/office/powerpoint/2010/main" spd="slow" p14:dur="2000">
+        <p15:prstTrans prst="fracture"/>
+      </p:transition>
+    </mc:Choice>
+    <mc:Fallback xmlns="">
+      <p:transition spd="slow">
+        <p:fade/>
+      </p:transition>
+    </mc:Fallback>
+  </mc:AlternateContent>
+  <p:timing>
+    <p:tnLst>
+      <p:par>
+        <p:cTn id="1" dur="indefinite" restart="never" nodeType="tmRoot"/>
+      </p:par>
+    </p:tnLst>
+  </p:timing>
+</p:sld>
+</file>
+
+<file path=ppt/slides/slide12.xml><?xml version="1.0" encoding="utf-8"?>
+<p:sld xmlns:a="http://schemas.openxmlformats.org/drawingml/2006/main" xmlns:r="http://schemas.openxmlformats.org/officeDocument/2006/relationships" xmlns:p="http://schemas.openxmlformats.org/presentationml/2006/main">
+  <p:cSld>
+    <p:spTree>
+      <p:nvGrpSpPr>
+        <p:cNvPr id="1" name=""/>
+        <p:cNvGrpSpPr/>
+        <p:nvPr/>
+      </p:nvGrpSpPr>
+      <p:grpSpPr>
+        <a:xfrm>
+          <a:off x="0" y="0"/>
+          <a:ext cx="0" cy="0"/>
+          <a:chOff x="0" y="0"/>
+          <a:chExt cx="0" cy="0"/>
+        </a:xfrm>
+      </p:grpSpPr>
+      <p:sp>
+        <p:nvSpPr>
+          <p:cNvPr id="4" name="Titre 3"/>
+          <p:cNvSpPr>
+            <a:spLocks noGrp="1"/>
+          </p:cNvSpPr>
+          <p:nvPr>
+            <p:ph type="title"/>
+          </p:nvPr>
+        </p:nvSpPr>
+        <p:spPr/>
+        <p:txBody>
+          <a:bodyPr/>
+          <a:lstStyle/>
+          <a:p>
+            <a:r>
+              <a:rPr lang="fr-FR" dirty="0" smtClean="0"/>
+              <a:t>Chapitre 5</a:t>
+            </a:r>
+            <a:endParaRPr lang="fr-FR" dirty="0"/>
+          </a:p>
+        </p:txBody>
+      </p:sp>
+      <p:sp>
+        <p:nvSpPr>
+          <p:cNvPr id="5" name="Espace réservé du contenu 4"/>
+          <p:cNvSpPr>
+            <a:spLocks noGrp="1"/>
+          </p:cNvSpPr>
+          <p:nvPr>
+            <p:ph idx="1"/>
+          </p:nvPr>
+        </p:nvSpPr>
+        <p:spPr/>
+        <p:txBody>
+          <a:bodyPr numCol="2"/>
+          <a:lstStyle/>
+          <a:p>
+            <a:r>
+              <a:rPr lang="fr-FR" sz="2000" dirty="0" smtClean="0"/>
+              <a:t>Jouer en équipe</a:t>
+            </a:r>
+          </a:p>
+          <a:p>
+            <a:r>
+              <a:rPr lang="fr-FR" sz="2000" dirty="0" smtClean="0"/>
+              <a:t>Enregistrer la progression</a:t>
+            </a:r>
+          </a:p>
+          <a:p>
+            <a:endParaRPr lang="fr-FR" sz="2000" dirty="0" smtClean="0"/>
+          </a:p>
+          <a:p>
+            <a:r>
+              <a:rPr lang="fr-FR" sz="2000" dirty="0" err="1" smtClean="0"/>
+              <a:t>Zefzefzef</a:t>
+            </a:r>
+            <a:endParaRPr lang="fr-FR" sz="2000" dirty="0" smtClean="0"/>
+          </a:p>
+          <a:p>
+            <a:r>
+              <a:rPr lang="fr-FR" sz="2000" dirty="0" err="1" smtClean="0"/>
+              <a:t>Zefzefzef</a:t>
+            </a:r>
+            <a:endParaRPr lang="fr-FR" sz="2000" dirty="0" smtClean="0"/>
+          </a:p>
+          <a:p>
+            <a:r>
+              <a:rPr lang="fr-FR" sz="2000" dirty="0" err="1" smtClean="0"/>
+              <a:t>Szadazdzad</a:t>
+            </a:r>
+            <a:endParaRPr lang="fr-FR" sz="2000" dirty="0" smtClean="0"/>
+          </a:p>
+          <a:p>
+            <a:r>
+              <a:rPr lang="fr-FR" sz="2000" dirty="0" err="1" smtClean="0"/>
+              <a:t>Zadazdazda</a:t>
+            </a:r>
+            <a:endParaRPr lang="fr-FR" sz="2000" dirty="0" smtClean="0"/>
+          </a:p>
+          <a:p>
+            <a:r>
+              <a:rPr lang="fr-FR" sz="2000" dirty="0" err="1" smtClean="0"/>
+              <a:t>Zdazdazdaz</a:t>
+            </a:r>
+            <a:endParaRPr lang="fr-FR" sz="2000" dirty="0" smtClean="0"/>
+          </a:p>
+          <a:p>
+            <a:r>
+              <a:rPr lang="fr-FR" sz="2000" dirty="0" err="1" smtClean="0"/>
+              <a:t>Dazdazda</a:t>
+            </a:r>
+            <a:endParaRPr lang="fr-FR" sz="2000" dirty="0" smtClean="0"/>
+          </a:p>
+          <a:p>
+            <a:r>
+              <a:rPr lang="fr-FR" sz="2000" dirty="0" err="1" smtClean="0"/>
+              <a:t>Dazdazd</a:t>
+            </a:r>
+            <a:endParaRPr lang="fr-FR" sz="2000" dirty="0" smtClean="0"/>
+          </a:p>
+          <a:p>
+            <a:r>
+              <a:rPr lang="fr-FR" sz="2000" dirty="0" err="1" smtClean="0"/>
+              <a:t>Azdzefzfz</a:t>
+            </a:r>
+            <a:endParaRPr lang="fr-FR" sz="2000" dirty="0" smtClean="0"/>
+          </a:p>
+          <a:p>
+            <a:r>
+              <a:rPr lang="fr-FR" sz="2000" dirty="0" err="1" smtClean="0"/>
+              <a:t>Zfezefze</a:t>
+            </a:r>
+            <a:endParaRPr lang="fr-FR" sz="2000" dirty="0" smtClean="0"/>
+          </a:p>
+        </p:txBody>
+      </p:sp>
+      <p:sp>
+        <p:nvSpPr>
+          <p:cNvPr id="6" name="Espace réservé du texte 5"/>
+          <p:cNvSpPr>
+            <a:spLocks noGrp="1"/>
+          </p:cNvSpPr>
+          <p:nvPr>
+            <p:ph type="body" sz="quarter" idx="13"/>
+          </p:nvPr>
+        </p:nvSpPr>
+        <p:spPr/>
+        <p:txBody>
+          <a:bodyPr/>
+          <a:lstStyle/>
+          <a:p>
+            <a:r>
+              <a:rPr lang="fr-FR" dirty="0" smtClean="0"/>
+              <a:t>Améliorations futures</a:t>
+            </a:r>
+            <a:endParaRPr lang="fr-FR" dirty="0"/>
+          </a:p>
+        </p:txBody>
+      </p:sp>
+    </p:spTree>
+    <p:extLst>
+      <p:ext uri="{BB962C8B-B14F-4D97-AF65-F5344CB8AC3E}">
+        <p14:creationId xmlns:p14="http://schemas.microsoft.com/office/powerpoint/2010/main" val="1848028617"/>
+      </p:ext>
+    </p:extLst>
+  </p:cSld>
+  <p:clrMapOvr>
+    <a:masterClrMapping/>
+  </p:clrMapOvr>
   <p:timing>
     <p:tnLst>
       <p:par>
@@ -4213,13 +4660,8 @@
           <a:p>
             <a:r>
               <a:rPr lang="fr-FR" dirty="0" smtClean="0"/>
-              <a:t>Chapitre </a:t>
-            </a:r>
-            <a:r>
-              <a:rPr lang="fr-FR" dirty="0" smtClean="0"/>
-              <a:t>1</a:t>
-            </a:r>
-            <a:endParaRPr lang="fr-FR" dirty="0" smtClean="0"/>
+              <a:t>Chapitre 1</a:t>
+            </a:r>
           </a:p>
         </p:txBody>
       </p:sp>
@@ -4233,13 +4675,13 @@
   <p:clrMapOvr>
     <a:masterClrMapping/>
   </p:clrMapOvr>
-  <mc:AlternateContent xmlns:mc="http://schemas.openxmlformats.org/markup-compatibility/2006">
-    <mc:Choice xmlns:p15="http://schemas.microsoft.com/office/powerpoint/2012/main" Requires="p15">
+  <mc:AlternateContent xmlns:mc="http://schemas.openxmlformats.org/markup-compatibility/2006" xmlns:p15="http://schemas.microsoft.com/office/powerpoint/2012/main">
+    <mc:Choice Requires="p15">
       <p:transition xmlns:p14="http://schemas.microsoft.com/office/powerpoint/2010/main" spd="slow" p14:dur="2000">
         <p15:prstTrans prst="drape"/>
       </p:transition>
     </mc:Choice>
-    <mc:Fallback>
+    <mc:Fallback xmlns="">
       <p:transition spd="slow">
         <p:fade/>
       </p:transition>
@@ -4287,6 +4729,10 @@
           <a:bodyPr/>
           <a:lstStyle/>
           <a:p>
+            <a:r>
+              <a:rPr lang="fr-FR" dirty="0" smtClean="0"/>
+              <a:t>Chapitre 1</a:t>
+            </a:r>
             <a:endParaRPr lang="fr-FR" dirty="0"/>
           </a:p>
         </p:txBody>
@@ -4330,25 +4776,35 @@
           </a:p>
         </p:txBody>
       </p:sp>
-      <p:sp>
-        <p:nvSpPr>
-          <p:cNvPr id="5" name="Espace réservé du contenu 4"/>
-          <p:cNvSpPr>
-            <a:spLocks noGrp="1"/>
-          </p:cNvSpPr>
+      <p:pic>
+        <p:nvPicPr>
+          <p:cNvPr id="9" name="Espace réservé du contenu 8"/>
+          <p:cNvPicPr>
+            <a:picLocks noGrp="1" noChangeAspect="1"/>
+          </p:cNvPicPr>
           <p:nvPr>
             <p:ph idx="1"/>
           </p:nvPr>
-        </p:nvSpPr>
-        <p:spPr/>
-        <p:txBody>
-          <a:bodyPr/>
-          <a:lstStyle/>
-          <a:p>
-            <a:endParaRPr lang="fr-FR"/>
-          </a:p>
-        </p:txBody>
-      </p:sp>
+        </p:nvPicPr>
+        <p:blipFill>
+          <a:blip r:embed="rId2">
+            <a:extLst>
+              <a:ext uri="{28A0092B-C50C-407E-A947-70E740481C1C}">
+                <a14:useLocalDpi xmlns:a14="http://schemas.microsoft.com/office/drawing/2010/main" val="0"/>
+              </a:ext>
+            </a:extLst>
+          </a:blip>
+          <a:stretch>
+            <a:fillRect/>
+          </a:stretch>
+        </p:blipFill>
+        <p:spPr>
+          <a:xfrm>
+            <a:off x="750437" y="875185"/>
+            <a:ext cx="7705418" cy="4056019"/>
+          </a:xfrm>
+        </p:spPr>
+      </p:pic>
     </p:spTree>
     <p:extLst>
       <p:ext uri="{BB962C8B-B14F-4D97-AF65-F5344CB8AC3E}">
@@ -4359,13 +4815,13 @@
   <p:clrMapOvr>
     <a:masterClrMapping/>
   </p:clrMapOvr>
-  <mc:AlternateContent xmlns:mc="http://schemas.openxmlformats.org/markup-compatibility/2006">
-    <mc:Choice xmlns:p14="http://schemas.microsoft.com/office/powerpoint/2010/main" Requires="p14">
+  <mc:AlternateContent xmlns:mc="http://schemas.openxmlformats.org/markup-compatibility/2006" xmlns:p14="http://schemas.microsoft.com/office/powerpoint/2010/main">
+    <mc:Choice Requires="p14">
       <p:transition spd="slow" p14:dur="4000">
         <p14:vortex dir="r"/>
       </p:transition>
     </mc:Choice>
-    <mc:Fallback>
+    <mc:Fallback xmlns="">
       <p:transition spd="slow">
         <p:fade/>
       </p:transition>
@@ -4410,14 +4866,12 @@
         </p:nvSpPr>
         <p:spPr/>
         <p:txBody>
-          <a:bodyPr>
-            <a:normAutofit/>
-          </a:bodyPr>
+          <a:bodyPr/>
           <a:lstStyle/>
           <a:p>
             <a:r>
               <a:rPr lang="fr-FR" dirty="0" smtClean="0"/>
-              <a:t>Création d’un éditeur</a:t>
+              <a:t>Chapitre 1</a:t>
             </a:r>
             <a:endParaRPr lang="fr-FR" dirty="0"/>
           </a:p>
@@ -4425,40 +4879,76 @@
       </p:sp>
       <p:sp>
         <p:nvSpPr>
-          <p:cNvPr id="3" name="Sous-titre 2"/>
-          <p:cNvSpPr>
-            <a:spLocks noGrp="1"/>
-          </p:cNvSpPr>
-          <p:nvPr>
-            <p:ph type="subTitle" idx="13"/>
-          </p:nvPr>
-        </p:nvSpPr>
+          <p:cNvPr id="4" name="Espace réservé du texte 3"/>
+          <p:cNvSpPr>
+            <a:spLocks noGrp="1"/>
+          </p:cNvSpPr>
+          <p:nvPr>
+            <p:ph type="body" sz="quarter" idx="13"/>
+          </p:nvPr>
+        </p:nvSpPr>
+        <p:spPr/>
+        <p:txBody>
+          <a:bodyPr/>
+          <a:lstStyle/>
+          <a:p>
+            <a:r>
+              <a:rPr lang="fr-FR" b="1" dirty="0" err="1"/>
+              <a:t>Unified</a:t>
+            </a:r>
+            <a:r>
+              <a:rPr lang="fr-FR" b="1" dirty="0"/>
+              <a:t> </a:t>
+            </a:r>
+            <a:r>
+              <a:rPr lang="fr-FR" b="1" dirty="0" err="1"/>
+              <a:t>Modeling</a:t>
+            </a:r>
+            <a:r>
+              <a:rPr lang="fr-FR" b="1" dirty="0"/>
+              <a:t> </a:t>
+            </a:r>
+            <a:r>
+              <a:rPr lang="fr-FR" b="1" dirty="0" err="1"/>
+              <a:t>Language</a:t>
+            </a:r>
+            <a:endParaRPr lang="fr-FR" dirty="0"/>
+          </a:p>
+        </p:txBody>
+      </p:sp>
+      <p:pic>
+        <p:nvPicPr>
+          <p:cNvPr id="3" name="Espace réservé du contenu 2"/>
+          <p:cNvPicPr>
+            <a:picLocks noGrp="1" noChangeAspect="1"/>
+          </p:cNvPicPr>
+          <p:nvPr>
+            <p:ph idx="1"/>
+          </p:nvPr>
+        </p:nvPicPr>
+        <p:blipFill>
+          <a:blip r:embed="rId2">
+            <a:extLst>
+              <a:ext uri="{28A0092B-C50C-407E-A947-70E740481C1C}">
+                <a14:useLocalDpi xmlns:a14="http://schemas.microsoft.com/office/drawing/2010/main" val="0"/>
+              </a:ext>
+            </a:extLst>
+          </a:blip>
+          <a:stretch>
+            <a:fillRect/>
+          </a:stretch>
+        </p:blipFill>
         <p:spPr>
           <a:xfrm>
-            <a:off x="3358120" y="1027282"/>
-            <a:ext cx="3188535" cy="400110"/>
+            <a:off x="835866" y="933319"/>
+            <a:ext cx="7391697" cy="4041884"/>
           </a:xfrm>
         </p:spPr>
-        <p:txBody>
-          <a:bodyPr/>
-          <a:lstStyle/>
-          <a:p>
-            <a:r>
-              <a:rPr lang="fr-FR" dirty="0" smtClean="0"/>
-              <a:t>Chapitre </a:t>
-            </a:r>
-            <a:r>
-              <a:rPr lang="fr-FR" dirty="0" smtClean="0"/>
-              <a:t>2</a:t>
-            </a:r>
-            <a:endParaRPr lang="fr-FR" dirty="0" smtClean="0"/>
-          </a:p>
-        </p:txBody>
-      </p:sp>
+      </p:pic>
     </p:spTree>
     <p:extLst>
       <p:ext uri="{BB962C8B-B14F-4D97-AF65-F5344CB8AC3E}">
-        <p14:creationId xmlns:p14="http://schemas.microsoft.com/office/powerpoint/2010/main" val="4079372471"/>
+        <p14:creationId xmlns:p14="http://schemas.microsoft.com/office/powerpoint/2010/main" val="1842622006"/>
       </p:ext>
     </p:extLst>
   </p:cSld>
@@ -4466,9 +4956,9 @@
     <a:masterClrMapping/>
   </p:clrMapOvr>
   <mc:AlternateContent xmlns:mc="http://schemas.openxmlformats.org/markup-compatibility/2006">
-    <mc:Choice xmlns:p15="http://schemas.microsoft.com/office/powerpoint/2012/main" Requires="p15">
-      <p:transition xmlns:p14="http://schemas.microsoft.com/office/powerpoint/2010/main" spd="slow" p14:dur="6000">
-        <p15:prstTrans prst="curtains"/>
+    <mc:Choice xmlns:p14="http://schemas.microsoft.com/office/powerpoint/2010/main" Requires="p14">
+      <p:transition spd="slow" p14:dur="800">
+        <p14:flythrough/>
       </p:transition>
     </mc:Choice>
     <mc:Fallback>
@@ -4516,6 +5006,36 @@
         </p:nvSpPr>
         <p:spPr/>
         <p:txBody>
+          <a:bodyPr>
+            <a:normAutofit/>
+          </a:bodyPr>
+          <a:lstStyle/>
+          <a:p>
+            <a:r>
+              <a:rPr lang="fr-FR" dirty="0" smtClean="0"/>
+              <a:t>Création d’un éditeur</a:t>
+            </a:r>
+            <a:endParaRPr lang="fr-FR" dirty="0"/>
+          </a:p>
+        </p:txBody>
+      </p:sp>
+      <p:sp>
+        <p:nvSpPr>
+          <p:cNvPr id="3" name="Sous-titre 2"/>
+          <p:cNvSpPr>
+            <a:spLocks noGrp="1"/>
+          </p:cNvSpPr>
+          <p:nvPr>
+            <p:ph type="subTitle" idx="13"/>
+          </p:nvPr>
+        </p:nvSpPr>
+        <p:spPr>
+          <a:xfrm>
+            <a:off x="3358120" y="1027282"/>
+            <a:ext cx="3188535" cy="400110"/>
+          </a:xfrm>
+        </p:spPr>
+        <p:txBody>
           <a:bodyPr/>
           <a:lstStyle/>
           <a:p>
@@ -4523,167 +5043,26 @@
               <a:rPr lang="fr-FR" dirty="0" smtClean="0"/>
               <a:t>Chapitre 2</a:t>
             </a:r>
-            <a:br>
-              <a:rPr lang="fr-FR" dirty="0" smtClean="0"/>
-            </a:br>
-            <a:endParaRPr lang="fr-FR" dirty="0"/>
-          </a:p>
-        </p:txBody>
-      </p:sp>
-      <p:sp>
-        <p:nvSpPr>
-          <p:cNvPr id="4" name="Espace réservé du texte 3"/>
-          <p:cNvSpPr>
-            <a:spLocks noGrp="1"/>
-          </p:cNvSpPr>
-          <p:nvPr>
-            <p:ph type="body" sz="quarter" idx="13"/>
-          </p:nvPr>
-        </p:nvSpPr>
-        <p:spPr/>
-        <p:txBody>
-          <a:bodyPr/>
-          <a:lstStyle/>
-          <a:p>
-            <a:r>
-              <a:rPr lang="fr-FR" dirty="0" smtClean="0"/>
-              <a:t>Création d’un éditeur</a:t>
-            </a:r>
-            <a:endParaRPr lang="fr-FR" dirty="0"/>
-          </a:p>
-        </p:txBody>
-      </p:sp>
-      <p:pic>
-        <p:nvPicPr>
-          <p:cNvPr id="7" name="Espace réservé du contenu 6"/>
-          <p:cNvPicPr>
-            <a:picLocks noGrp="1" noChangeAspect="1"/>
-          </p:cNvPicPr>
-          <p:nvPr>
-            <p:ph idx="1"/>
-          </p:nvPr>
-        </p:nvPicPr>
-        <p:blipFill>
-          <a:blip r:embed="rId2">
-            <a:extLst>
-              <a:ext uri="{28A0092B-C50C-407E-A947-70E740481C1C}">
-                <a14:useLocalDpi xmlns:a14="http://schemas.microsoft.com/office/drawing/2010/main" val="0"/>
-              </a:ext>
-            </a:extLst>
-          </a:blip>
-          <a:stretch>
-            <a:fillRect/>
-          </a:stretch>
-        </p:blipFill>
-        <p:spPr>
-          <a:xfrm>
-            <a:off x="4672836" y="1201168"/>
-            <a:ext cx="4219647" cy="3395662"/>
-          </a:xfrm>
-        </p:spPr>
-      </p:pic>
-      <p:sp>
-        <p:nvSpPr>
-          <p:cNvPr id="3" name="ZoneTexte 2"/>
-          <p:cNvSpPr txBox="1"/>
-          <p:nvPr/>
-        </p:nvSpPr>
-        <p:spPr>
-          <a:xfrm>
-            <a:off x="968980" y="2330841"/>
-            <a:ext cx="2799164" cy="892552"/>
-          </a:xfrm>
-          <a:prstGeom prst="rect">
-            <a:avLst/>
-          </a:prstGeom>
-          <a:noFill/>
-          <a:ln>
-            <a:noFill/>
-          </a:ln>
-        </p:spPr>
-        <p:style>
-          <a:lnRef idx="2">
-            <a:schemeClr val="accent6"/>
-          </a:lnRef>
-          <a:fillRef idx="1">
-            <a:schemeClr val="lt1"/>
-          </a:fillRef>
-          <a:effectRef idx="0">
-            <a:schemeClr val="accent6"/>
-          </a:effectRef>
-          <a:fontRef idx="minor">
-            <a:schemeClr val="dk1"/>
-          </a:fontRef>
-        </p:style>
-        <p:txBody>
-          <a:bodyPr wrap="none" rtlCol="0">
-            <a:spAutoFit/>
-          </a:bodyPr>
-          <a:lstStyle/>
-          <a:p>
-            <a:r>
-              <a:rPr lang="fr-FR" sz="2600" dirty="0" smtClean="0">
-                <a:solidFill>
-                  <a:srgbClr val="123A61"/>
-                </a:solidFill>
-                <a:latin typeface="Segoe UI Black" panose="020B0A02040204020203" pitchFamily="34" charset="0"/>
-                <a:ea typeface="Segoe UI Black" panose="020B0A02040204020203" pitchFamily="34" charset="0"/>
-                <a:cs typeface="Segoe UI Black" panose="020B0A02040204020203" pitchFamily="34" charset="0"/>
-              </a:rPr>
-              <a:t>Sérialisation de </a:t>
-            </a:r>
-          </a:p>
-          <a:p>
-            <a:r>
-              <a:rPr lang="fr-FR" sz="2600" dirty="0">
-                <a:solidFill>
-                  <a:srgbClr val="123A61"/>
-                </a:solidFill>
-                <a:latin typeface="Segoe UI Black" panose="020B0A02040204020203" pitchFamily="34" charset="0"/>
-                <a:ea typeface="Segoe UI Black" panose="020B0A02040204020203" pitchFamily="34" charset="0"/>
-                <a:cs typeface="Segoe UI Black" panose="020B0A02040204020203" pitchFamily="34" charset="0"/>
-              </a:rPr>
-              <a:t>	</a:t>
-            </a:r>
-            <a:r>
-              <a:rPr lang="fr-FR" sz="2600" dirty="0" smtClean="0">
-                <a:solidFill>
-                  <a:srgbClr val="123A61"/>
-                </a:solidFill>
-                <a:latin typeface="Segoe UI Black" panose="020B0A02040204020203" pitchFamily="34" charset="0"/>
-                <a:ea typeface="Segoe UI Black" panose="020B0A02040204020203" pitchFamily="34" charset="0"/>
-                <a:cs typeface="Segoe UI Black" panose="020B0A02040204020203" pitchFamily="34" charset="0"/>
-              </a:rPr>
-              <a:t>l’histoire</a:t>
-            </a:r>
-            <a:endParaRPr lang="fr-FR" sz="2600" dirty="0">
-              <a:solidFill>
-                <a:srgbClr val="123A61"/>
-              </a:solidFill>
-              <a:latin typeface="Segoe UI Black" panose="020B0A02040204020203" pitchFamily="34" charset="0"/>
-              <a:ea typeface="Segoe UI Black" panose="020B0A02040204020203" pitchFamily="34" charset="0"/>
-              <a:cs typeface="Segoe UI Black" panose="020B0A02040204020203" pitchFamily="34" charset="0"/>
-            </a:endParaRPr>
           </a:p>
         </p:txBody>
       </p:sp>
     </p:spTree>
     <p:extLst>
       <p:ext uri="{BB962C8B-B14F-4D97-AF65-F5344CB8AC3E}">
-        <p14:creationId xmlns:p14="http://schemas.microsoft.com/office/powerpoint/2010/main" val="285527331"/>
+        <p14:creationId xmlns:p14="http://schemas.microsoft.com/office/powerpoint/2010/main" val="4079372471"/>
       </p:ext>
     </p:extLst>
   </p:cSld>
   <p:clrMapOvr>
     <a:masterClrMapping/>
   </p:clrMapOvr>
-  <mc:AlternateContent xmlns:mc="http://schemas.openxmlformats.org/markup-compatibility/2006">
-    <mc:Choice xmlns:p15="http://schemas.microsoft.com/office/powerpoint/2012/main" Requires="p15">
-      <p:transition xmlns:p14="http://schemas.microsoft.com/office/powerpoint/2010/main" spd="slow" p14:dur="3250">
-        <p15:prstTrans prst="origami"/>
+  <mc:AlternateContent xmlns:mc="http://schemas.openxmlformats.org/markup-compatibility/2006" xmlns:p15="http://schemas.microsoft.com/office/powerpoint/2012/main">
+    <mc:Choice Requires="p15">
+      <p:transition xmlns:p14="http://schemas.microsoft.com/office/powerpoint/2010/main" spd="slow" p14:dur="6000">
+        <p15:prstTrans prst="curtains"/>
       </p:transition>
     </mc:Choice>
-    <mc:Fallback>
+    <mc:Fallback xmlns="">
       <p:transition spd="slow">
         <p:fade/>
       </p:transition>
@@ -4733,20 +5112,23 @@
           <a:p>
             <a:r>
               <a:rPr lang="fr-FR" dirty="0" smtClean="0"/>
-              <a:t>Création des menus</a:t>
-            </a:r>
+              <a:t>Chapitre 2</a:t>
+            </a:r>
+            <a:br>
+              <a:rPr lang="fr-FR" dirty="0" smtClean="0"/>
+            </a:br>
             <a:endParaRPr lang="fr-FR" dirty="0"/>
           </a:p>
         </p:txBody>
       </p:sp>
       <p:sp>
         <p:nvSpPr>
-          <p:cNvPr id="3" name="Sous-titre 2"/>
-          <p:cNvSpPr>
-            <a:spLocks noGrp="1"/>
-          </p:cNvSpPr>
-          <p:nvPr>
-            <p:ph type="subTitle" idx="13"/>
+          <p:cNvPr id="4" name="Espace réservé du texte 3"/>
+          <p:cNvSpPr>
+            <a:spLocks noGrp="1"/>
+          </p:cNvSpPr>
+          <p:nvPr>
+            <p:ph type="body" sz="quarter" idx="13"/>
           </p:nvPr>
         </p:nvSpPr>
         <p:spPr/>
@@ -4756,33 +5138,143 @@
           <a:p>
             <a:r>
               <a:rPr lang="fr-FR" dirty="0" smtClean="0"/>
-              <a:t>Chapitre </a:t>
-            </a:r>
-            <a:r>
-              <a:rPr lang="fr-FR" dirty="0" smtClean="0"/>
-              <a:t>3</a:t>
+              <a:t>Création d’un éditeur</a:t>
             </a:r>
             <a:endParaRPr lang="fr-FR" dirty="0"/>
+          </a:p>
+        </p:txBody>
+      </p:sp>
+      <p:pic>
+        <p:nvPicPr>
+          <p:cNvPr id="7" name="Espace réservé du contenu 6"/>
+          <p:cNvPicPr>
+            <a:picLocks noGrp="1" noChangeAspect="1"/>
+          </p:cNvPicPr>
+          <p:nvPr>
+            <p:ph idx="1"/>
+          </p:nvPr>
+        </p:nvPicPr>
+        <p:blipFill>
+          <a:blip r:embed="rId2">
+            <a:extLst>
+              <a:ext uri="{28A0092B-C50C-407E-A947-70E740481C1C}">
+                <a14:useLocalDpi xmlns:a14="http://schemas.microsoft.com/office/drawing/2010/main" val="0"/>
+              </a:ext>
+            </a:extLst>
+          </a:blip>
+          <a:stretch>
+            <a:fillRect/>
+          </a:stretch>
+        </p:blipFill>
+        <p:spPr>
+          <a:xfrm>
+            <a:off x="4672836" y="1201168"/>
+            <a:ext cx="4219647" cy="3395662"/>
+          </a:xfrm>
+        </p:spPr>
+      </p:pic>
+      <p:sp>
+        <p:nvSpPr>
+          <p:cNvPr id="3" name="ZoneTexte 2"/>
+          <p:cNvSpPr txBox="1"/>
+          <p:nvPr/>
+        </p:nvSpPr>
+        <p:spPr>
+          <a:xfrm>
+            <a:off x="968980" y="2330841"/>
+            <a:ext cx="2799164" cy="892552"/>
+          </a:xfrm>
+          <a:prstGeom prst="rect">
+            <a:avLst/>
+          </a:prstGeom>
+          <a:noFill/>
+          <a:ln>
+            <a:noFill/>
+          </a:ln>
+        </p:spPr>
+        <p:style>
+          <a:lnRef idx="2">
+            <a:schemeClr val="accent6"/>
+          </a:lnRef>
+          <a:fillRef idx="1">
+            <a:schemeClr val="lt1"/>
+          </a:fillRef>
+          <a:effectRef idx="0">
+            <a:schemeClr val="accent6"/>
+          </a:effectRef>
+          <a:fontRef idx="minor">
+            <a:schemeClr val="dk1"/>
+          </a:fontRef>
+        </p:style>
+        <p:txBody>
+          <a:bodyPr wrap="none" rtlCol="0">
+            <a:spAutoFit/>
+          </a:bodyPr>
+          <a:lstStyle/>
+          <a:p>
+            <a:r>
+              <a:rPr lang="fr-FR" sz="2600" dirty="0" smtClean="0">
+                <a:solidFill>
+                  <a:srgbClr val="123A61"/>
+                </a:solidFill>
+                <a:latin typeface="Segoe UI Black" panose="020B0A02040204020203" pitchFamily="34" charset="0"/>
+                <a:ea typeface="Segoe UI Black" panose="020B0A02040204020203" pitchFamily="34" charset="0"/>
+                <a:cs typeface="Segoe UI Black" panose="020B0A02040204020203" pitchFamily="34" charset="0"/>
+              </a:rPr>
+              <a:t>Sérialisation de </a:t>
+            </a:r>
+          </a:p>
+          <a:p>
+            <a:r>
+              <a:rPr lang="fr-FR" sz="2600" dirty="0">
+                <a:solidFill>
+                  <a:srgbClr val="123A61"/>
+                </a:solidFill>
+                <a:latin typeface="Segoe UI Black" panose="020B0A02040204020203" pitchFamily="34" charset="0"/>
+                <a:ea typeface="Segoe UI Black" panose="020B0A02040204020203" pitchFamily="34" charset="0"/>
+                <a:cs typeface="Segoe UI Black" panose="020B0A02040204020203" pitchFamily="34" charset="0"/>
+              </a:rPr>
+              <a:t>	</a:t>
+            </a:r>
+            <a:r>
+              <a:rPr lang="fr-FR" sz="2600" dirty="0" smtClean="0">
+                <a:solidFill>
+                  <a:srgbClr val="123A61"/>
+                </a:solidFill>
+                <a:latin typeface="Segoe UI Black" panose="020B0A02040204020203" pitchFamily="34" charset="0"/>
+                <a:ea typeface="Segoe UI Black" panose="020B0A02040204020203" pitchFamily="34" charset="0"/>
+                <a:cs typeface="Segoe UI Black" panose="020B0A02040204020203" pitchFamily="34" charset="0"/>
+              </a:rPr>
+              <a:t>l’histoire</a:t>
+            </a:r>
+            <a:endParaRPr lang="fr-FR" sz="2600" dirty="0">
+              <a:solidFill>
+                <a:srgbClr val="123A61"/>
+              </a:solidFill>
+              <a:latin typeface="Segoe UI Black" panose="020B0A02040204020203" pitchFamily="34" charset="0"/>
+              <a:ea typeface="Segoe UI Black" panose="020B0A02040204020203" pitchFamily="34" charset="0"/>
+              <a:cs typeface="Segoe UI Black" panose="020B0A02040204020203" pitchFamily="34" charset="0"/>
+            </a:endParaRPr>
           </a:p>
         </p:txBody>
       </p:sp>
     </p:spTree>
     <p:extLst>
       <p:ext uri="{BB962C8B-B14F-4D97-AF65-F5344CB8AC3E}">
-        <p14:creationId xmlns:p14="http://schemas.microsoft.com/office/powerpoint/2010/main" val="4017012175"/>
+        <p14:creationId xmlns:p14="http://schemas.microsoft.com/office/powerpoint/2010/main" val="285527331"/>
       </p:ext>
     </p:extLst>
   </p:cSld>
   <p:clrMapOvr>
     <a:masterClrMapping/>
   </p:clrMapOvr>
-  <mc:AlternateContent xmlns:mc="http://schemas.openxmlformats.org/markup-compatibility/2006">
-    <mc:Choice xmlns:p15="http://schemas.microsoft.com/office/powerpoint/2012/main" Requires="p15">
-      <p:transition xmlns:p14="http://schemas.microsoft.com/office/powerpoint/2010/main" spd="slow" p14:dur="2000">
-        <p15:prstTrans prst="wind"/>
+  <mc:AlternateContent xmlns:mc="http://schemas.openxmlformats.org/markup-compatibility/2006" xmlns:p15="http://schemas.microsoft.com/office/powerpoint/2012/main">
+    <mc:Choice Requires="p15">
+      <p:transition xmlns:p14="http://schemas.microsoft.com/office/powerpoint/2010/main" spd="slow" p14:dur="3250">
+        <p15:prstTrans prst="origami"/>
       </p:transition>
     </mc:Choice>
-    <mc:Fallback>
+    <mc:Fallback xmlns="">
       <p:transition spd="slow">
         <p:fade/>
       </p:transition>
@@ -4817,12 +5309,12 @@
       </p:grpSpPr>
       <p:sp>
         <p:nvSpPr>
-          <p:cNvPr id="5" name="Espace réservé du texte 4"/>
-          <p:cNvSpPr>
-            <a:spLocks noGrp="1"/>
-          </p:cNvSpPr>
-          <p:nvPr>
-            <p:ph type="body" sz="quarter" idx="13"/>
+          <p:cNvPr id="2" name="Titre 1"/>
+          <p:cNvSpPr>
+            <a:spLocks noGrp="1"/>
+          </p:cNvSpPr>
+          <p:nvPr>
+            <p:ph type="title"/>
           </p:nvPr>
         </p:nvSpPr>
         <p:spPr/>
@@ -4838,43 +5330,14 @@
           </a:p>
         </p:txBody>
       </p:sp>
-      <p:pic>
-        <p:nvPicPr>
-          <p:cNvPr id="9" name="Espace réservé du contenu 8"/>
-          <p:cNvPicPr>
-            <a:picLocks noGrp="1" noChangeAspect="1"/>
-          </p:cNvPicPr>
-          <p:nvPr>
-            <p:ph sz="half" idx="2"/>
-          </p:nvPr>
-        </p:nvPicPr>
-        <p:blipFill>
-          <a:blip r:embed="rId2">
-            <a:extLst>
-              <a:ext uri="{28A0092B-C50C-407E-A947-70E740481C1C}">
-                <a14:useLocalDpi xmlns:a14="http://schemas.microsoft.com/office/drawing/2010/main" val="0"/>
-              </a:ext>
-            </a:extLst>
-          </a:blip>
-          <a:stretch>
-            <a:fillRect/>
-          </a:stretch>
-        </p:blipFill>
-        <p:spPr>
-          <a:xfrm>
-            <a:off x="3689130" y="838132"/>
-            <a:ext cx="5330501" cy="4206834"/>
-          </a:xfrm>
-        </p:spPr>
-      </p:pic>
-      <p:sp>
-        <p:nvSpPr>
-          <p:cNvPr id="2" name="Titre 1"/>
-          <p:cNvSpPr>
-            <a:spLocks noGrp="1"/>
-          </p:cNvSpPr>
-          <p:nvPr>
-            <p:ph type="title"/>
+      <p:sp>
+        <p:nvSpPr>
+          <p:cNvPr id="3" name="Sous-titre 2"/>
+          <p:cNvSpPr>
+            <a:spLocks noGrp="1"/>
+          </p:cNvSpPr>
+          <p:nvPr>
+            <p:ph type="subTitle" idx="13"/>
           </p:nvPr>
         </p:nvSpPr>
         <p:spPr/>
@@ -4885,37 +5348,6 @@
             <a:r>
               <a:rPr lang="fr-FR" dirty="0" smtClean="0"/>
               <a:t>Chapitre 3</a:t>
-            </a:r>
-            <a:br>
-              <a:rPr lang="fr-FR" dirty="0" smtClean="0"/>
-            </a:br>
-            <a:endParaRPr lang="fr-FR" dirty="0"/>
-          </a:p>
-        </p:txBody>
-      </p:sp>
-      <p:sp>
-        <p:nvSpPr>
-          <p:cNvPr id="7" name="Espace réservé du texte 6"/>
-          <p:cNvSpPr>
-            <a:spLocks noGrp="1"/>
-          </p:cNvSpPr>
-          <p:nvPr>
-            <p:ph type="body" sz="quarter" idx="16"/>
-          </p:nvPr>
-        </p:nvSpPr>
-        <p:spPr>
-          <a:xfrm>
-            <a:off x="314226" y="2363164"/>
-            <a:ext cx="2831629" cy="589563"/>
-          </a:xfrm>
-        </p:spPr>
-        <p:txBody>
-          <a:bodyPr/>
-          <a:lstStyle/>
-          <a:p>
-            <a:r>
-              <a:rPr lang="fr-FR" dirty="0" smtClean="0"/>
-              <a:t>Exemple</a:t>
             </a:r>
             <a:endParaRPr lang="fr-FR" dirty="0"/>
           </a:p>
@@ -4924,20 +5356,20 @@
     </p:spTree>
     <p:extLst>
       <p:ext uri="{BB962C8B-B14F-4D97-AF65-F5344CB8AC3E}">
-        <p14:creationId xmlns:p14="http://schemas.microsoft.com/office/powerpoint/2010/main" val="1554283246"/>
+        <p14:creationId xmlns:p14="http://schemas.microsoft.com/office/powerpoint/2010/main" val="4017012175"/>
       </p:ext>
     </p:extLst>
   </p:cSld>
   <p:clrMapOvr>
     <a:masterClrMapping/>
   </p:clrMapOvr>
-  <mc:AlternateContent xmlns:mc="http://schemas.openxmlformats.org/markup-compatibility/2006">
-    <mc:Choice xmlns:p14="http://schemas.microsoft.com/office/powerpoint/2010/main" Requires="p14">
-      <p:transition spd="slow" p14:dur="1400">
-        <p14:ripple/>
+  <mc:AlternateContent xmlns:mc="http://schemas.openxmlformats.org/markup-compatibility/2006" xmlns:p15="http://schemas.microsoft.com/office/powerpoint/2012/main">
+    <mc:Choice Requires="p15">
+      <p:transition xmlns:p14="http://schemas.microsoft.com/office/powerpoint/2010/main" spd="slow" p14:dur="2000">
+        <p15:prstTrans prst="wind"/>
       </p:transition>
     </mc:Choice>
-    <mc:Fallback>
+    <mc:Fallback xmlns="">
       <p:transition spd="slow">
         <p:fade/>
       </p:transition>
@@ -4972,12 +5404,12 @@
       </p:grpSpPr>
       <p:sp>
         <p:nvSpPr>
-          <p:cNvPr id="2" name="Titre 1"/>
-          <p:cNvSpPr>
-            <a:spLocks noGrp="1"/>
-          </p:cNvSpPr>
-          <p:nvPr>
-            <p:ph type="title"/>
+          <p:cNvPr id="5" name="Espace réservé du texte 4"/>
+          <p:cNvSpPr>
+            <a:spLocks noGrp="1"/>
+          </p:cNvSpPr>
+          <p:nvPr>
+            <p:ph type="body" sz="quarter" idx="13"/>
           </p:nvPr>
         </p:nvSpPr>
         <p:spPr/>
@@ -4987,7 +5419,7 @@
           <a:p>
             <a:r>
               <a:rPr lang="fr-FR" dirty="0" smtClean="0"/>
-              <a:t>Liste des items</a:t>
+              <a:t>Création des menus</a:t>
             </a:r>
             <a:endParaRPr lang="fr-FR" dirty="0"/>
           </a:p>
@@ -4995,12 +5427,12 @@
       </p:sp>
       <p:sp>
         <p:nvSpPr>
-          <p:cNvPr id="3" name="Sous-titre 2"/>
-          <p:cNvSpPr>
-            <a:spLocks noGrp="1"/>
-          </p:cNvSpPr>
-          <p:nvPr>
-            <p:ph type="subTitle" idx="13"/>
+          <p:cNvPr id="2" name="Titre 1"/>
+          <p:cNvSpPr>
+            <a:spLocks noGrp="1"/>
+          </p:cNvSpPr>
+          <p:nvPr>
+            <p:ph type="title"/>
           </p:nvPr>
         </p:nvSpPr>
         <p:spPr/>
@@ -5010,33 +5442,91 @@
           <a:p>
             <a:r>
               <a:rPr lang="fr-FR" dirty="0" smtClean="0"/>
-              <a:t>Chapitre </a:t>
-            </a:r>
-            <a:r>
+              <a:t>Chapitre 3</a:t>
+            </a:r>
+            <a:br>
               <a:rPr lang="fr-FR" dirty="0" smtClean="0"/>
-              <a:t>4</a:t>
-            </a:r>
+            </a:br>
             <a:endParaRPr lang="fr-FR" dirty="0"/>
           </a:p>
         </p:txBody>
       </p:sp>
+      <p:sp>
+        <p:nvSpPr>
+          <p:cNvPr id="7" name="Espace réservé du texte 6"/>
+          <p:cNvSpPr>
+            <a:spLocks noGrp="1"/>
+          </p:cNvSpPr>
+          <p:nvPr>
+            <p:ph type="body" sz="quarter" idx="16"/>
+          </p:nvPr>
+        </p:nvSpPr>
+        <p:spPr>
+          <a:xfrm>
+            <a:off x="314226" y="2099256"/>
+            <a:ext cx="2831629" cy="998113"/>
+          </a:xfrm>
+        </p:spPr>
+        <p:txBody>
+          <a:bodyPr>
+            <a:normAutofit/>
+          </a:bodyPr>
+          <a:lstStyle/>
+          <a:p>
+            <a:r>
+              <a:rPr lang="fr-FR" dirty="0" smtClean="0"/>
+              <a:t>Exemple d’une classe</a:t>
+            </a:r>
+            <a:endParaRPr lang="fr-FR" dirty="0"/>
+          </a:p>
+        </p:txBody>
+      </p:sp>
+      <p:pic>
+        <p:nvPicPr>
+          <p:cNvPr id="4" name="Espace réservé du contenu 3"/>
+          <p:cNvPicPr>
+            <a:picLocks noGrp="1" noChangeAspect="1"/>
+          </p:cNvPicPr>
+          <p:nvPr>
+            <p:ph sz="half" idx="2"/>
+          </p:nvPr>
+        </p:nvPicPr>
+        <p:blipFill>
+          <a:blip r:embed="rId2">
+            <a:extLst>
+              <a:ext uri="{28A0092B-C50C-407E-A947-70E740481C1C}">
+                <a14:useLocalDpi xmlns:a14="http://schemas.microsoft.com/office/drawing/2010/main" val="0"/>
+              </a:ext>
+            </a:extLst>
+          </a:blip>
+          <a:stretch>
+            <a:fillRect/>
+          </a:stretch>
+        </p:blipFill>
+        <p:spPr>
+          <a:xfrm>
+            <a:off x="3664039" y="817085"/>
+            <a:ext cx="5368585" cy="4208741"/>
+          </a:xfrm>
+        </p:spPr>
+      </p:pic>
     </p:spTree>
     <p:extLst>
       <p:ext uri="{BB962C8B-B14F-4D97-AF65-F5344CB8AC3E}">
-        <p14:creationId xmlns:p14="http://schemas.microsoft.com/office/powerpoint/2010/main" val="2969424450"/>
+        <p14:creationId xmlns:p14="http://schemas.microsoft.com/office/powerpoint/2010/main" val="1554283246"/>
       </p:ext>
     </p:extLst>
   </p:cSld>
   <p:clrMapOvr>
     <a:masterClrMapping/>
   </p:clrMapOvr>
-  <mc:AlternateContent xmlns:mc="http://schemas.openxmlformats.org/markup-compatibility/2006">
-    <mc:Choice xmlns:p15="http://schemas.microsoft.com/office/powerpoint/2012/main" Requires="p15">
-      <p:transition xmlns:p14="http://schemas.microsoft.com/office/powerpoint/2010/main" spd="slow" p14:dur="2000">
-        <p15:prstTrans prst="fracture"/>
+  <mc:AlternateContent xmlns:mc="http://schemas.openxmlformats.org/markup-compatibility/2006" xmlns:p14="http://schemas.microsoft.com/office/powerpoint/2010/main">
+    <mc:Choice Requires="p14">
+      <p:transition spd="slow" p14:dur="1400">
+        <p14:ripple/>
       </p:transition>
     </mc:Choice>
-    <mc:Fallback>
+    <mc:Fallback xmlns="">
       <p:transition spd="slow">
         <p:fade/>
       </p:transition>
@@ -5071,12 +5561,12 @@
       </p:grpSpPr>
       <p:sp>
         <p:nvSpPr>
-          <p:cNvPr id="5" name="Espace réservé du texte 4"/>
-          <p:cNvSpPr>
-            <a:spLocks noGrp="1"/>
-          </p:cNvSpPr>
-          <p:nvPr>
-            <p:ph type="body" sz="quarter" idx="13"/>
+          <p:cNvPr id="2" name="Titre 1"/>
+          <p:cNvSpPr>
+            <a:spLocks noGrp="1"/>
+          </p:cNvSpPr>
+          <p:nvPr>
+            <p:ph type="title"/>
           </p:nvPr>
         </p:nvSpPr>
         <p:spPr/>
@@ -5092,43 +5582,14 @@
           </a:p>
         </p:txBody>
       </p:sp>
-      <p:pic>
-        <p:nvPicPr>
-          <p:cNvPr id="9" name="Espace réservé du contenu 8"/>
-          <p:cNvPicPr>
-            <a:picLocks noGrp="1" noChangeAspect="1"/>
-          </p:cNvPicPr>
-          <p:nvPr>
-            <p:ph sz="half" idx="2"/>
-          </p:nvPr>
-        </p:nvPicPr>
-        <p:blipFill>
-          <a:blip r:embed="rId2">
-            <a:extLst>
-              <a:ext uri="{28A0092B-C50C-407E-A947-70E740481C1C}">
-                <a14:useLocalDpi xmlns:a14="http://schemas.microsoft.com/office/drawing/2010/main" val="0"/>
-              </a:ext>
-            </a:extLst>
-          </a:blip>
-          <a:stretch>
-            <a:fillRect/>
-          </a:stretch>
-        </p:blipFill>
-        <p:spPr>
-          <a:xfrm>
-            <a:off x="3689130" y="838132"/>
-            <a:ext cx="5330501" cy="4206834"/>
-          </a:xfrm>
-        </p:spPr>
-      </p:pic>
-      <p:sp>
-        <p:nvSpPr>
-          <p:cNvPr id="2" name="Titre 1"/>
-          <p:cNvSpPr>
-            <a:spLocks noGrp="1"/>
-          </p:cNvSpPr>
-          <p:nvPr>
-            <p:ph type="title"/>
+      <p:sp>
+        <p:nvSpPr>
+          <p:cNvPr id="3" name="Sous-titre 2"/>
+          <p:cNvSpPr>
+            <a:spLocks noGrp="1"/>
+          </p:cNvSpPr>
+          <p:nvPr>
+            <p:ph type="subTitle" idx="13"/>
           </p:nvPr>
         </p:nvSpPr>
         <p:spPr/>
@@ -5139,36 +5600,6 @@
             <a:r>
               <a:rPr lang="fr-FR" dirty="0" smtClean="0"/>
               <a:t>Chapitre 4</a:t>
-            </a:r>
-            <a:endParaRPr lang="fr-FR" dirty="0"/>
-          </a:p>
-        </p:txBody>
-      </p:sp>
-      <p:sp>
-        <p:nvSpPr>
-          <p:cNvPr id="7" name="Espace réservé du texte 6"/>
-          <p:cNvSpPr>
-            <a:spLocks noGrp="1"/>
-          </p:cNvSpPr>
-          <p:nvPr>
-            <p:ph type="body" sz="quarter" idx="16"/>
-          </p:nvPr>
-        </p:nvSpPr>
-        <p:spPr>
-          <a:xfrm>
-            <a:off x="314226" y="2363164"/>
-            <a:ext cx="2831629" cy="589563"/>
-          </a:xfrm>
-        </p:spPr>
-        <p:txBody>
-          <a:bodyPr>
-            <a:normAutofit fontScale="77500" lnSpcReduction="20000"/>
-          </a:bodyPr>
-          <a:lstStyle/>
-          <a:p>
-            <a:r>
-              <a:rPr lang="fr-FR" dirty="0" smtClean="0"/>
-              <a:t>Utilisation d’un bloc statique</a:t>
             </a:r>
             <a:endParaRPr lang="fr-FR" dirty="0"/>
           </a:p>
@@ -5177,20 +5608,20 @@
     </p:spTree>
     <p:extLst>
       <p:ext uri="{BB962C8B-B14F-4D97-AF65-F5344CB8AC3E}">
-        <p14:creationId xmlns:p14="http://schemas.microsoft.com/office/powerpoint/2010/main" val="3121328382"/>
+        <p14:creationId xmlns:p14="http://schemas.microsoft.com/office/powerpoint/2010/main" val="2969424450"/>
       </p:ext>
     </p:extLst>
   </p:cSld>
   <p:clrMapOvr>
     <a:masterClrMapping/>
   </p:clrMapOvr>
-  <mc:AlternateContent xmlns:mc="http://schemas.openxmlformats.org/markup-compatibility/2006">
-    <mc:Choice xmlns:p15="http://schemas.microsoft.com/office/powerpoint/2012/main" Requires="p15">
-      <p:transition xmlns:p14="http://schemas.microsoft.com/office/powerpoint/2010/main" spd="slow" p14:dur="1250">
-        <p15:prstTrans prst="airplane"/>
+  <mc:AlternateContent xmlns:mc="http://schemas.openxmlformats.org/markup-compatibility/2006" xmlns:p15="http://schemas.microsoft.com/office/powerpoint/2012/main">
+    <mc:Choice Requires="p15">
+      <p:transition xmlns:p14="http://schemas.microsoft.com/office/powerpoint/2010/main" spd="slow" p14:dur="2000">
+        <p15:prstTrans prst="fracture"/>
       </p:transition>
     </mc:Choice>
-    <mc:Fallback>
+    <mc:Fallback xmlns="">
       <p:transition spd="slow">
         <p:fade/>
       </p:transition>

</xml_diff>